<commit_message>
computer- based measuring device (prezentaciq)
поправени са грешки
</commit_message>
<xml_diff>
--- a/based measuring device.pptx
+++ b/based measuring device.pptx
@@ -3816,11 +3816,18 @@
           <a:lstStyle/>
           <a:p>
             <a:r>
+              <a:rPr lang="en-US" dirty="0" smtClean="0">
+                <a:latin typeface="Adobe Gothic Std B" panose="020B0800000000000000" pitchFamily="34" charset="-128"/>
+                <a:ea typeface="Adobe Gothic Std B" panose="020B0800000000000000" pitchFamily="34" charset="-128"/>
+              </a:rPr>
+              <a:t>Computer- based </a:t>
+            </a:r>
+            <a:r>
               <a:rPr lang="en-US" dirty="0">
                 <a:latin typeface="Adobe Gothic Std B" panose="020B0800000000000000" pitchFamily="34" charset="-128"/>
                 <a:ea typeface="Adobe Gothic Std B" panose="020B0800000000000000" pitchFamily="34" charset="-128"/>
               </a:rPr>
-              <a:t>based measuring device</a:t>
+              <a:t>measuring device</a:t>
             </a:r>
           </a:p>
         </p:txBody>
@@ -4019,25 +4026,103 @@
                 <a:latin typeface="Adobe Kaiti Std R" panose="02020400000000000000" pitchFamily="18" charset="-128"/>
                 <a:ea typeface="Adobe Kaiti Std R" panose="02020400000000000000" pitchFamily="18" charset="-128"/>
               </a:rPr>
-              <a:t>It measures 3 physics dimensions - electrical currency, voltage and </a:t>
+              <a:t>The </a:t>
             </a:r>
             <a:r>
               <a:rPr lang="en-US" sz="2800" dirty="0" smtClean="0">
                 <a:latin typeface="Adobe Kaiti Std R" panose="02020400000000000000" pitchFamily="18" charset="-128"/>
                 <a:ea typeface="Adobe Kaiti Std R" panose="02020400000000000000" pitchFamily="18" charset="-128"/>
               </a:rPr>
-              <a:t>resistance</a:t>
-            </a:r>
-            <a:r>
-              <a:rPr lang="bg-BG" sz="2800" dirty="0" smtClean="0">
+              <a:t>results</a:t>
+            </a:r>
+            <a:r>
+              <a:rPr lang="bg-BG" sz="2800" dirty="0" smtClean="0"/>
+              <a:t> </a:t>
+            </a:r>
+            <a:r>
+              <a:rPr lang="en-US" sz="2800" dirty="0" smtClean="0">
+                <a:latin typeface="Adobe Kaiti Std R" panose="02020400000000000000" pitchFamily="18" charset="-128"/>
+                <a:ea typeface="Adobe Kaiti Std R" panose="02020400000000000000" pitchFamily="18" charset="-128"/>
+              </a:rPr>
+              <a:t>are </a:t>
+            </a:r>
+            <a:r>
+              <a:rPr lang="en-US" sz="2800" dirty="0">
+                <a:latin typeface="Adobe Kaiti Std R" panose="02020400000000000000" pitchFamily="18" charset="-128"/>
+                <a:ea typeface="Adobe Kaiti Std R" panose="02020400000000000000" pitchFamily="18" charset="-128"/>
+              </a:rPr>
+              <a:t>depicted </a:t>
+            </a:r>
+            <a:r>
+              <a:rPr lang="en-US" sz="2800" dirty="0" smtClean="0">
+                <a:latin typeface="Adobe Kaiti Std R" panose="02020400000000000000" pitchFamily="18" charset="-128"/>
+                <a:ea typeface="Adobe Kaiti Std R" panose="02020400000000000000" pitchFamily="18" charset="-128"/>
+              </a:rPr>
+              <a:t>on </a:t>
+            </a:r>
+            <a:r>
+              <a:rPr lang="en-US" sz="2800">
+                <a:latin typeface="Adobe Kaiti Std R" panose="02020400000000000000" pitchFamily="18" charset="-128"/>
+                <a:ea typeface="Adobe Kaiti Std R" panose="02020400000000000000" pitchFamily="18" charset="-128"/>
+              </a:rPr>
+              <a:t>a </a:t>
+            </a:r>
+            <a:r>
+              <a:rPr lang="en-US" sz="2800" smtClean="0">
+                <a:latin typeface="Adobe Kaiti Std R" panose="02020400000000000000" pitchFamily="18" charset="-128"/>
+                <a:ea typeface="Adobe Kaiti Std R" panose="02020400000000000000" pitchFamily="18" charset="-128"/>
+              </a:rPr>
+              <a:t>computer. </a:t>
+            </a:r>
+            <a:r>
+              <a:rPr lang="en-US" sz="2800" dirty="0">
+                <a:latin typeface="Adobe Kaiti Std R" panose="02020400000000000000" pitchFamily="18" charset="-128"/>
+                <a:ea typeface="Adobe Kaiti Std R" panose="02020400000000000000" pitchFamily="18" charset="-128"/>
+              </a:rPr>
+              <a:t>With the use of interface with </a:t>
+            </a:r>
+            <a:r>
+              <a:rPr lang="en-US" sz="2800" dirty="0" smtClean="0">
+                <a:latin typeface="Adobe Kaiti Std R" panose="02020400000000000000" pitchFamily="18" charset="-128"/>
+                <a:ea typeface="Adobe Kaiti Std R" panose="02020400000000000000" pitchFamily="18" charset="-128"/>
+              </a:rPr>
+              <a:t>buttons</a:t>
+            </a:r>
+            <a:r>
+              <a:rPr lang="en-US" sz="2800" dirty="0">
+                <a:latin typeface="Adobe Kaiti Std R" panose="02020400000000000000" pitchFamily="18" charset="-128"/>
+                <a:ea typeface="Adobe Kaiti Std R" panose="02020400000000000000" pitchFamily="18" charset="-128"/>
+              </a:rPr>
+              <a:t>, </a:t>
+            </a:r>
+            <a:r>
+              <a:rPr lang="en-US" sz="2800" dirty="0" smtClean="0">
+                <a:latin typeface="Adobe Kaiti Std R" panose="02020400000000000000" pitchFamily="18" charset="-128"/>
+                <a:ea typeface="Adobe Kaiti Std R" panose="02020400000000000000" pitchFamily="18" charset="-128"/>
+              </a:rPr>
+              <a:t>the </a:t>
+            </a:r>
+            <a:r>
+              <a:rPr lang="en-US" sz="2800" dirty="0">
+                <a:latin typeface="Adobe Kaiti Std R" panose="02020400000000000000" pitchFamily="18" charset="-128"/>
+                <a:ea typeface="Adobe Kaiti Std R" panose="02020400000000000000" pitchFamily="18" charset="-128"/>
+              </a:rPr>
+              <a:t>requested dimension is chosen and it's value is being exposed to the </a:t>
+            </a:r>
+            <a:r>
+              <a:rPr lang="en-US" sz="2800" dirty="0" smtClean="0">
+                <a:latin typeface="Adobe Kaiti Std R" panose="02020400000000000000" pitchFamily="18" charset="-128"/>
+                <a:ea typeface="Adobe Kaiti Std R" panose="02020400000000000000" pitchFamily="18" charset="-128"/>
+              </a:rPr>
+              <a:t>user</a:t>
+            </a:r>
+            <a:r>
+              <a:rPr lang="en-US" sz="2800" dirty="0">
                 <a:latin typeface="Adobe Kaiti Std R" panose="02020400000000000000" pitchFamily="18" charset="-128"/>
                 <a:ea typeface="Adobe Kaiti Std R" panose="02020400000000000000" pitchFamily="18" charset="-128"/>
               </a:rPr>
               <a:t>.</a:t>
             </a:r>
-          </a:p>
-          <a:p>
-            <a:endParaRPr lang="en-US" dirty="0"/>
           </a:p>
         </p:txBody>
       </p:sp>
@@ -4556,7 +4641,15 @@
           <a:p>
             <a:r>
               <a:rPr lang="en-US" sz="4800" dirty="0"/>
-              <a:t>In future, we'd like to improve /advance our project by adding graphics in real time and the possibility of saving the results</a:t>
+              <a:t>In future, we'd like to </a:t>
+            </a:r>
+            <a:r>
+              <a:rPr lang="en-US" sz="4800" dirty="0" smtClean="0"/>
+              <a:t>advance </a:t>
+            </a:r>
+            <a:r>
+              <a:rPr lang="en-US" sz="4800" dirty="0"/>
+              <a:t>our project by adding graphics in real time and the possibility of saving the results</a:t>
             </a:r>
             <a:endParaRPr lang="en-US" sz="4800" dirty="0"/>
           </a:p>

</xml_diff>